<commit_message>
modif diapo et algorigramme rapport
</commit_message>
<xml_diff>
--- a/doc/Diapo_LOTFI_MACCARINELLI_MARION.pptx
+++ b/doc/Diapo_LOTFI_MACCARINELLI_MARION.pptx
@@ -46062,7 +46062,7 @@
       </a:lvl9pPr>
     </p:otherStyle>
   </p:txStyles>
-  <p:extLst mod="1">
+  <p:extLst>
     <p:ext uri="{27BBF7A9-308A-43DC-89C8-2F10F3537804}">
       <p15:sldGuideLst xmlns:p15="http://schemas.microsoft.com/office/powerpoint/2012/main">
         <p15:guide id="1" orient="horz" pos="527" userDrawn="1">
@@ -46792,43 +46792,6 @@
       </p:sp>
       <p:sp>
         <p:nvSpPr>
-          <p:cNvPr id="14" name="Espace réservé du texte 13">
-            <a:extLst>
-              <a:ext uri="{FF2B5EF4-FFF2-40B4-BE49-F238E27FC236}">
-                <a16:creationId xmlns:a16="http://schemas.microsoft.com/office/drawing/2014/main" id="{1A32FF73-A652-43C6-96BD-425851F591BC}"/>
-              </a:ext>
-            </a:extLst>
-          </p:cNvPr>
-          <p:cNvSpPr>
-            <a:spLocks noGrp="1"/>
-          </p:cNvSpPr>
-          <p:nvPr>
-            <p:ph type="body" idx="30"/>
-          </p:nvPr>
-        </p:nvSpPr>
-        <p:spPr>
-          <a:xfrm>
-            <a:off x="6060538" y="4392485"/>
-            <a:ext cx="2944368" cy="1419822"/>
-          </a:xfrm>
-        </p:spPr>
-        <p:txBody>
-          <a:bodyPr rtlCol="0">
-            <a:normAutofit/>
-          </a:bodyPr>
-          <a:lstStyle/>
-          <a:p>
-            <a:pPr rtl="0"/>
-            <a:r>
-              <a:rPr lang="fr-FR" dirty="0" err="1"/>
-              <a:t>blabla</a:t>
-            </a:r>
-            <a:endParaRPr lang="fr-FR" dirty="0"/>
-          </a:p>
-        </p:txBody>
-      </p:sp>
-      <p:sp>
-        <p:nvSpPr>
           <p:cNvPr id="4" name="Espace réservé du numéro de diapositive 3">
             <a:extLst>
               <a:ext uri="{FF2B5EF4-FFF2-40B4-BE49-F238E27FC236}">
@@ -46910,6 +46873,66 @@
               <a:rPr lang="fr-FR" b="1" i="1" dirty="0"/>
               <a:t>Robot explorateur M1 IFI Université de Nice Sophia-Antipolis</a:t>
             </a:r>
+          </a:p>
+        </p:txBody>
+      </p:sp>
+      <p:sp>
+        <p:nvSpPr>
+          <p:cNvPr id="13" name="Espace réservé du texte 6">
+            <a:extLst>
+              <a:ext uri="{FF2B5EF4-FFF2-40B4-BE49-F238E27FC236}">
+                <a16:creationId xmlns:a16="http://schemas.microsoft.com/office/drawing/2014/main" id="{38B7476D-EF5E-4782-A7C8-941F6F34619B}"/>
+              </a:ext>
+            </a:extLst>
+          </p:cNvPr>
+          <p:cNvSpPr>
+            <a:spLocks noGrp="1"/>
+          </p:cNvSpPr>
+          <p:nvPr>
+            <p:ph type="body" idx="27"/>
+          </p:nvPr>
+        </p:nvSpPr>
+        <p:spPr>
+          <a:xfrm>
+            <a:off x="6096000" y="4261586"/>
+            <a:ext cx="4830501" cy="1745675"/>
+          </a:xfrm>
+        </p:spPr>
+        <p:txBody>
+          <a:bodyPr/>
+          <a:lstStyle/>
+          <a:p>
+            <a:pPr marL="800100" lvl="1" indent="-342900">
+              <a:buFont typeface="Arial" panose="020B0604020202020204" pitchFamily="34" charset="0"/>
+              <a:buChar char="•"/>
+            </a:pPr>
+            <a:r>
+              <a:rPr lang="fr-FR" sz="1800" dirty="0"/>
+              <a:t>Pas de marche arrière </a:t>
+            </a:r>
+          </a:p>
+          <a:p>
+            <a:pPr marL="742950" lvl="1" indent="-285750">
+              <a:buFont typeface="Arial" panose="020B0604020202020204" pitchFamily="34" charset="0"/>
+              <a:buChar char="•"/>
+            </a:pPr>
+            <a:r>
+              <a:rPr lang="fr-FR" dirty="0"/>
+              <a:t>Pas de rotations différentes des roues en simultané </a:t>
+            </a:r>
+          </a:p>
+          <a:p>
+            <a:pPr marL="742950" lvl="1" indent="-285750">
+              <a:buFont typeface="Arial" panose="020B0604020202020204" pitchFamily="34" charset="0"/>
+              <a:buChar char="•"/>
+            </a:pPr>
+            <a:r>
+              <a:rPr lang="fr-FR" sz="1800" dirty="0"/>
+              <a:t>Cherche un obstacle à longer </a:t>
+            </a:r>
+          </a:p>
+          <a:p>
+            <a:endParaRPr lang="fr-FR" dirty="0"/>
           </a:p>
         </p:txBody>
       </p:sp>
@@ -46974,10 +46997,10 @@
       </p:sp>
       <p:sp>
         <p:nvSpPr>
-          <p:cNvPr id="3" name="Espace réservé du texte 2">
-            <a:extLst>
-              <a:ext uri="{FF2B5EF4-FFF2-40B4-BE49-F238E27FC236}">
-                <a16:creationId xmlns:a16="http://schemas.microsoft.com/office/drawing/2014/main" id="{E66139D5-668D-4A3D-B6B6-F71EC385C8FF}"/>
+          <p:cNvPr id="8" name="Espace réservé du texte 7">
+            <a:extLst>
+              <a:ext uri="{FF2B5EF4-FFF2-40B4-BE49-F238E27FC236}">
+                <a16:creationId xmlns:a16="http://schemas.microsoft.com/office/drawing/2014/main" id="{EEA947F5-DD66-4D26-BA34-D1D8F7CE9010}"/>
               </a:ext>
             </a:extLst>
           </p:cNvPr>
@@ -46985,58 +47008,30 @@
             <a:spLocks noGrp="1"/>
           </p:cNvSpPr>
           <p:nvPr>
-            <p:ph type="body" idx="1"/>
-          </p:nvPr>
-        </p:nvSpPr>
-        <p:spPr/>
-        <p:txBody>
-          <a:bodyPr rtlCol="0"/>
-          <a:lstStyle/>
-          <a:p>
-            <a:pPr rtl="0"/>
-            <a:r>
-              <a:rPr lang="fr-FR" dirty="0" err="1"/>
-              <a:t>blabla</a:t>
-            </a:r>
-            <a:endParaRPr lang="fr-FR" dirty="0"/>
-          </a:p>
-          <a:p>
-            <a:pPr rtl="0"/>
-            <a:endParaRPr lang="fr-FR" dirty="0"/>
-          </a:p>
-        </p:txBody>
-      </p:sp>
-      <p:sp>
-        <p:nvSpPr>
-          <p:cNvPr id="8" name="Espace réservé du texte 7">
-            <a:extLst>
-              <a:ext uri="{FF2B5EF4-FFF2-40B4-BE49-F238E27FC236}">
-                <a16:creationId xmlns:a16="http://schemas.microsoft.com/office/drawing/2014/main" id="{EEA947F5-DD66-4D26-BA34-D1D8F7CE9010}"/>
-              </a:ext>
-            </a:extLst>
-          </p:cNvPr>
-          <p:cNvSpPr>
-            <a:spLocks noGrp="1"/>
-          </p:cNvSpPr>
-          <p:nvPr>
             <p:ph type="body" idx="14"/>
           </p:nvPr>
         </p:nvSpPr>
-        <p:spPr/>
+        <p:spPr>
+          <a:xfrm>
+            <a:off x="814338" y="3722408"/>
+            <a:ext cx="4452987" cy="1328330"/>
+          </a:xfrm>
+        </p:spPr>
         <p:txBody>
           <a:bodyPr rtlCol="0">
             <a:normAutofit/>
           </a:bodyPr>
           <a:lstStyle/>
           <a:p>
-            <a:pPr rtl="0"/>
-            <a:r>
-              <a:rPr lang="fr-FR" dirty="0" err="1"/>
-              <a:t>Blabla</a:t>
-            </a:r>
             <a:r>
               <a:rPr lang="fr-FR" dirty="0"/>
-              <a:t> intro</a:t>
+              <a:t>même raisonnement de déplacement</a:t>
+            </a:r>
+          </a:p>
+          <a:p>
+            <a:r>
+              <a:rPr lang="fr-FR" dirty="0"/>
+              <a:t>Ne se focaliser plus à longer l’obstacle </a:t>
             </a:r>
           </a:p>
           <a:p>
@@ -47199,6 +47194,42 @@
           </a:prstGeom>
         </p:spPr>
       </p:pic>
+      <p:sp>
+        <p:nvSpPr>
+          <p:cNvPr id="11" name="Espace réservé du texte 4">
+            <a:extLst>
+              <a:ext uri="{FF2B5EF4-FFF2-40B4-BE49-F238E27FC236}">
+                <a16:creationId xmlns:a16="http://schemas.microsoft.com/office/drawing/2014/main" id="{C6CDF7DB-EFE6-457A-AA4A-2C68A1CAF9D7}"/>
+              </a:ext>
+            </a:extLst>
+          </p:cNvPr>
+          <p:cNvSpPr>
+            <a:spLocks noGrp="1"/>
+          </p:cNvSpPr>
+          <p:nvPr>
+            <p:ph type="body" idx="1"/>
+          </p:nvPr>
+        </p:nvSpPr>
+        <p:spPr>
+          <a:xfrm>
+            <a:off x="539561" y="4768440"/>
+            <a:ext cx="5733327" cy="978407"/>
+          </a:xfrm>
+        </p:spPr>
+        <p:txBody>
+          <a:bodyPr>
+            <a:normAutofit/>
+          </a:bodyPr>
+          <a:lstStyle/>
+          <a:p>
+            <a:r>
+              <a:rPr lang="fr-FR" dirty="0"/>
+              <a:t>On cherche juste à l’éviter et toujours garder une distance de sécurité </a:t>
+            </a:r>
+            <a:endParaRPr lang="fr-FR" sz="1400" dirty="0"/>
+          </a:p>
+        </p:txBody>
+      </p:sp>
     </p:spTree>
     <p:extLst>
       <p:ext uri="{BB962C8B-B14F-4D97-AF65-F5344CB8AC3E}">
@@ -47304,7 +47335,12 @@
             <p:ph type="body" sz="quarter" idx="26"/>
           </p:nvPr>
         </p:nvSpPr>
-        <p:spPr/>
+        <p:spPr>
+          <a:xfrm>
+            <a:off x="1226927" y="2760518"/>
+            <a:ext cx="978408" cy="978408"/>
+          </a:xfrm>
+        </p:spPr>
         <p:txBody>
           <a:bodyPr rtlCol="0"/>
           <a:lstStyle/>
@@ -47348,10 +47384,10 @@
       </p:sp>
       <p:sp>
         <p:nvSpPr>
-          <p:cNvPr id="8" name="Espace réservé du texte 7">
-            <a:extLst>
-              <a:ext uri="{FF2B5EF4-FFF2-40B4-BE49-F238E27FC236}">
-                <a16:creationId xmlns:a16="http://schemas.microsoft.com/office/drawing/2014/main" id="{D5450AF9-6A8E-4054-A832-F7BF5DA0E16C}"/>
+          <p:cNvPr id="12" name="Espace réservé du texte 11">
+            <a:extLst>
+              <a:ext uri="{FF2B5EF4-FFF2-40B4-BE49-F238E27FC236}">
+                <a16:creationId xmlns:a16="http://schemas.microsoft.com/office/drawing/2014/main" id="{CC46A248-3DD2-4083-A410-269D3C38BC7D}"/>
               </a:ext>
             </a:extLst>
           </p:cNvPr>
@@ -47359,12 +47395,80 @@
             <a:spLocks noGrp="1"/>
           </p:cNvSpPr>
           <p:nvPr>
-            <p:ph type="body" idx="14"/>
+            <p:ph type="body" sz="quarter" idx="28"/>
           </p:nvPr>
         </p:nvSpPr>
         <p:spPr>
           <a:xfrm>
-            <a:off x="1716131" y="4306637"/>
+            <a:off x="8515702" y="2743897"/>
+            <a:ext cx="978408" cy="978408"/>
+          </a:xfrm>
+        </p:spPr>
+        <p:txBody>
+          <a:bodyPr rtlCol="0"/>
+          <a:lstStyle/>
+          <a:p>
+            <a:pPr rtl="0"/>
+            <a:r>
+              <a:rPr lang="fr-FR" dirty="0"/>
+              <a:t>2</a:t>
+            </a:r>
+          </a:p>
+        </p:txBody>
+      </p:sp>
+      <p:sp>
+        <p:nvSpPr>
+          <p:cNvPr id="16" name="Espace réservé du texte 15">
+            <a:extLst>
+              <a:ext uri="{FF2B5EF4-FFF2-40B4-BE49-F238E27FC236}">
+                <a16:creationId xmlns:a16="http://schemas.microsoft.com/office/drawing/2014/main" id="{A9BECA94-5E25-4E6D-A58C-7792A89CED7C}"/>
+              </a:ext>
+            </a:extLst>
+          </p:cNvPr>
+          <p:cNvSpPr>
+            <a:spLocks noGrp="1"/>
+          </p:cNvSpPr>
+          <p:nvPr>
+            <p:ph type="body" idx="32"/>
+          </p:nvPr>
+        </p:nvSpPr>
+        <p:spPr>
+          <a:xfrm>
+            <a:off x="6549742" y="3858610"/>
+            <a:ext cx="2944368" cy="328343"/>
+          </a:xfrm>
+        </p:spPr>
+        <p:txBody>
+          <a:bodyPr rtlCol="0"/>
+          <a:lstStyle/>
+          <a:p>
+            <a:pPr algn="r" rtl="0"/>
+            <a:r>
+              <a:rPr lang="fr-FR" dirty="0"/>
+              <a:t>PROBLEMES</a:t>
+            </a:r>
+          </a:p>
+        </p:txBody>
+      </p:sp>
+      <p:sp>
+        <p:nvSpPr>
+          <p:cNvPr id="14" name="Espace réservé du texte 13">
+            <a:extLst>
+              <a:ext uri="{FF2B5EF4-FFF2-40B4-BE49-F238E27FC236}">
+                <a16:creationId xmlns:a16="http://schemas.microsoft.com/office/drawing/2014/main" id="{1A32FF73-A652-43C6-96BD-425851F591BC}"/>
+              </a:ext>
+            </a:extLst>
+          </p:cNvPr>
+          <p:cNvSpPr>
+            <a:spLocks noGrp="1"/>
+          </p:cNvSpPr>
+          <p:nvPr>
+            <p:ph type="body" idx="30"/>
+          </p:nvPr>
+        </p:nvSpPr>
+        <p:spPr>
+          <a:xfrm>
+            <a:off x="6060538" y="4392485"/>
             <a:ext cx="2944368" cy="1419822"/>
           </a:xfrm>
         </p:spPr>
@@ -47374,117 +47478,10 @@
           </a:bodyPr>
           <a:lstStyle/>
           <a:p>
-            <a:pPr rtl="0"/>
-            <a:r>
-              <a:rPr lang="fr-FR" dirty="0" err="1"/>
-              <a:t>blabla</a:t>
-            </a:r>
-            <a:endParaRPr lang="fr-FR" dirty="0"/>
-          </a:p>
-        </p:txBody>
-      </p:sp>
-      <p:sp>
-        <p:nvSpPr>
-          <p:cNvPr id="12" name="Espace réservé du texte 11">
-            <a:extLst>
-              <a:ext uri="{FF2B5EF4-FFF2-40B4-BE49-F238E27FC236}">
-                <a16:creationId xmlns:a16="http://schemas.microsoft.com/office/drawing/2014/main" id="{CC46A248-3DD2-4083-A410-269D3C38BC7D}"/>
-              </a:ext>
-            </a:extLst>
-          </p:cNvPr>
-          <p:cNvSpPr>
-            <a:spLocks noGrp="1"/>
-          </p:cNvSpPr>
-          <p:nvPr>
-            <p:ph type="body" sz="quarter" idx="28"/>
-          </p:nvPr>
-        </p:nvSpPr>
-        <p:spPr>
-          <a:xfrm>
-            <a:off x="8515702" y="2743897"/>
-            <a:ext cx="978408" cy="978408"/>
-          </a:xfrm>
-        </p:spPr>
-        <p:txBody>
-          <a:bodyPr rtlCol="0"/>
-          <a:lstStyle/>
-          <a:p>
-            <a:pPr rtl="0"/>
             <a:r>
               <a:rPr lang="fr-FR" dirty="0"/>
-              <a:t>2</a:t>
-            </a:r>
-          </a:p>
-        </p:txBody>
-      </p:sp>
-      <p:sp>
-        <p:nvSpPr>
-          <p:cNvPr id="16" name="Espace réservé du texte 15">
-            <a:extLst>
-              <a:ext uri="{FF2B5EF4-FFF2-40B4-BE49-F238E27FC236}">
-                <a16:creationId xmlns:a16="http://schemas.microsoft.com/office/drawing/2014/main" id="{A9BECA94-5E25-4E6D-A58C-7792A89CED7C}"/>
-              </a:ext>
-            </a:extLst>
-          </p:cNvPr>
-          <p:cNvSpPr>
-            <a:spLocks noGrp="1"/>
-          </p:cNvSpPr>
-          <p:nvPr>
-            <p:ph type="body" idx="32"/>
-          </p:nvPr>
-        </p:nvSpPr>
-        <p:spPr>
-          <a:xfrm>
-            <a:off x="6549742" y="3858610"/>
-            <a:ext cx="2944368" cy="328343"/>
-          </a:xfrm>
-        </p:spPr>
-        <p:txBody>
-          <a:bodyPr rtlCol="0"/>
-          <a:lstStyle/>
-          <a:p>
-            <a:pPr algn="r" rtl="0"/>
-            <a:r>
-              <a:rPr lang="fr-FR" dirty="0"/>
-              <a:t>PROBLEMES</a:t>
-            </a:r>
-          </a:p>
-        </p:txBody>
-      </p:sp>
-      <p:sp>
-        <p:nvSpPr>
-          <p:cNvPr id="14" name="Espace réservé du texte 13">
-            <a:extLst>
-              <a:ext uri="{FF2B5EF4-FFF2-40B4-BE49-F238E27FC236}">
-                <a16:creationId xmlns:a16="http://schemas.microsoft.com/office/drawing/2014/main" id="{1A32FF73-A652-43C6-96BD-425851F591BC}"/>
-              </a:ext>
-            </a:extLst>
-          </p:cNvPr>
-          <p:cNvSpPr>
-            <a:spLocks noGrp="1"/>
-          </p:cNvSpPr>
-          <p:nvPr>
-            <p:ph type="body" idx="30"/>
-          </p:nvPr>
-        </p:nvSpPr>
-        <p:spPr>
-          <a:xfrm>
-            <a:off x="6060538" y="4392485"/>
-            <a:ext cx="2944368" cy="1419822"/>
-          </a:xfrm>
-        </p:spPr>
-        <p:txBody>
-          <a:bodyPr rtlCol="0">
-            <a:normAutofit/>
-          </a:bodyPr>
-          <a:lstStyle/>
-          <a:p>
-            <a:pPr rtl="0"/>
-            <a:r>
-              <a:rPr lang="fr-FR" dirty="0" err="1"/>
-              <a:t>blabla</a:t>
-            </a:r>
-            <a:endParaRPr lang="fr-FR" dirty="0"/>
+              <a:t>marche arrière non maîtrisée </a:t>
+            </a:r>
           </a:p>
         </p:txBody>
       </p:sp>
@@ -47574,6 +47571,36 @@
           </a:p>
         </p:txBody>
       </p:sp>
+      <p:pic>
+        <p:nvPicPr>
+          <p:cNvPr id="18" name="Image 17">
+            <a:extLst>
+              <a:ext uri="{FF2B5EF4-FFF2-40B4-BE49-F238E27FC236}">
+                <a16:creationId xmlns:a16="http://schemas.microsoft.com/office/drawing/2014/main" id="{EF745796-687F-4E5F-8E5C-67D2F0BEA1D2}"/>
+              </a:ext>
+            </a:extLst>
+          </p:cNvPr>
+          <p:cNvPicPr>
+            <a:picLocks noChangeAspect="1"/>
+          </p:cNvPicPr>
+          <p:nvPr/>
+        </p:nvPicPr>
+        <p:blipFill>
+          <a:blip r:embed="rId3"/>
+          <a:stretch>
+            <a:fillRect/>
+          </a:stretch>
+        </p:blipFill>
+        <p:spPr>
+          <a:xfrm>
+            <a:off x="-3040273" y="4306637"/>
+            <a:ext cx="8534400" cy="4305300"/>
+          </a:xfrm>
+          <a:prstGeom prst="rect">
+            <a:avLst/>
+          </a:prstGeom>
+        </p:spPr>
+      </p:pic>
     </p:spTree>
     <p:extLst>
       <p:ext uri="{BB962C8B-B14F-4D97-AF65-F5344CB8AC3E}">
@@ -48326,13 +48353,13 @@
   <p:clrMapOvr>
     <a:masterClrMapping/>
   </p:clrMapOvr>
-  <mc:AlternateContent xmlns:mc="http://schemas.openxmlformats.org/markup-compatibility/2006">
-    <mc:Choice xmlns:p159="http://schemas.microsoft.com/office/powerpoint/2015/09/main" Requires="p159">
+  <mc:AlternateContent xmlns:mc="http://schemas.openxmlformats.org/markup-compatibility/2006" xmlns:p159="http://schemas.microsoft.com/office/powerpoint/2015/09/main">
+    <mc:Choice Requires="p159">
       <p:transition xmlns:p14="http://schemas.microsoft.com/office/powerpoint/2010/main" spd="slow" p14:dur="2000">
         <p159:morph option="byObject"/>
       </p:transition>
     </mc:Choice>
-    <mc:Fallback>
+    <mc:Fallback xmlns="">
       <p:transition spd="slow">
         <p:fade/>
       </p:transition>

</xml_diff>